<commit_message>
Restructure workshops post TA meeting
</commit_message>
<xml_diff>
--- a/docs/science_truth_honesty.pptx
+++ b/docs/science_truth_honesty.pptx
@@ -4,6 +4,9 @@
   <p:sldMasterIdLst>
     <p:sldMasterId id="2147483648" r:id="rId4"/>
   </p:sldMasterIdLst>
+  <p:notesMasterIdLst>
+    <p:notesMasterId r:id="rId54"/>
+  </p:notesMasterIdLst>
   <p:sldIdLst>
     <p:sldId id="256" r:id="rId5"/>
     <p:sldId id="257" r:id="rId6"/>
@@ -160,12 +163,438 @@
 </p:presentation>
 </file>
 
-<file path=ppt/revisionInfo.xml><?xml version="1.0" encoding="utf-8"?>
-<p1510:revInfo xmlns:a="http://schemas.openxmlformats.org/drawingml/2006/main" xmlns:r="http://schemas.openxmlformats.org/officeDocument/2006/relationships" xmlns:p1510="http://schemas.microsoft.com/office/powerpoint/2015/10/main">
-  <p1510:revLst>
-    <p1510:client id="{1933BEA6-93BA-466E-829F-6AC622947F3E}" v="20" dt="2023-01-16T14:46:57.641"/>
-  </p1510:revLst>
-</p1510:revInfo>
+<file path=ppt/notesMasters/notesMaster1.xml><?xml version="1.0" encoding="utf-8"?>
+<p:notesMaster xmlns:a="http://schemas.openxmlformats.org/drawingml/2006/main" xmlns:r="http://schemas.openxmlformats.org/officeDocument/2006/relationships" xmlns:p="http://schemas.openxmlformats.org/presentationml/2006/main">
+  <p:cSld>
+    <p:bg>
+      <p:bgRef idx="1001">
+        <a:schemeClr val="bg1"/>
+      </p:bgRef>
+    </p:bg>
+    <p:spTree>
+      <p:nvGrpSpPr>
+        <p:cNvPr id="1" name=""/>
+        <p:cNvGrpSpPr/>
+        <p:nvPr/>
+      </p:nvGrpSpPr>
+      <p:grpSpPr>
+        <a:xfrm>
+          <a:off x="0" y="0"/>
+          <a:ext cx="0" cy="0"/>
+          <a:chOff x="0" y="0"/>
+          <a:chExt cx="0" cy="0"/>
+        </a:xfrm>
+      </p:grpSpPr>
+      <p:sp>
+        <p:nvSpPr>
+          <p:cNvPr id="2" name="Header Placeholder 1"/>
+          <p:cNvSpPr>
+            <a:spLocks noGrp="1"/>
+          </p:cNvSpPr>
+          <p:nvPr>
+            <p:ph type="hdr" sz="quarter"/>
+          </p:nvPr>
+        </p:nvSpPr>
+        <p:spPr>
+          <a:xfrm>
+            <a:off x="0" y="0"/>
+            <a:ext cx="2971800" cy="458788"/>
+          </a:xfrm>
+          <a:prstGeom prst="rect">
+            <a:avLst/>
+          </a:prstGeom>
+        </p:spPr>
+        <p:txBody>
+          <a:bodyPr vert="horz" lIns="91440" tIns="45720" rIns="91440" bIns="45720" rtlCol="0"/>
+          <a:lstStyle>
+            <a:lvl1pPr algn="l">
+              <a:defRPr sz="1200"/>
+            </a:lvl1pPr>
+          </a:lstStyle>
+          <a:p>
+            <a:endParaRPr lang="en-US"/>
+          </a:p>
+        </p:txBody>
+      </p:sp>
+      <p:sp>
+        <p:nvSpPr>
+          <p:cNvPr id="3" name="Date Placeholder 2"/>
+          <p:cNvSpPr>
+            <a:spLocks noGrp="1"/>
+          </p:cNvSpPr>
+          <p:nvPr>
+            <p:ph type="dt" idx="1"/>
+          </p:nvPr>
+        </p:nvSpPr>
+        <p:spPr>
+          <a:xfrm>
+            <a:off x="3884613" y="0"/>
+            <a:ext cx="2971800" cy="458788"/>
+          </a:xfrm>
+          <a:prstGeom prst="rect">
+            <a:avLst/>
+          </a:prstGeom>
+        </p:spPr>
+        <p:txBody>
+          <a:bodyPr vert="horz" lIns="91440" tIns="45720" rIns="91440" bIns="45720" rtlCol="0"/>
+          <a:lstStyle>
+            <a:lvl1pPr algn="r">
+              <a:defRPr sz="1200"/>
+            </a:lvl1pPr>
+          </a:lstStyle>
+          <a:p>
+            <a:fld id="{826BC068-B3EF-7345-960E-EBD1BBF6ABD5}" type="datetimeFigureOut">
+              <a:rPr lang="en-US" smtClean="0"/>
+              <a:t>1/12/24</a:t>
+            </a:fld>
+            <a:endParaRPr lang="en-US"/>
+          </a:p>
+        </p:txBody>
+      </p:sp>
+      <p:sp>
+        <p:nvSpPr>
+          <p:cNvPr id="4" name="Slide Image Placeholder 3"/>
+          <p:cNvSpPr>
+            <a:spLocks noGrp="1" noRot="1" noChangeAspect="1"/>
+          </p:cNvSpPr>
+          <p:nvPr>
+            <p:ph type="sldImg" idx="2"/>
+          </p:nvPr>
+        </p:nvSpPr>
+        <p:spPr>
+          <a:xfrm>
+            <a:off x="685800" y="1143000"/>
+            <a:ext cx="5486400" cy="3086100"/>
+          </a:xfrm>
+          <a:prstGeom prst="rect">
+            <a:avLst/>
+          </a:prstGeom>
+          <a:noFill/>
+          <a:ln w="12700">
+            <a:solidFill>
+              <a:prstClr val="black"/>
+            </a:solidFill>
+          </a:ln>
+        </p:spPr>
+        <p:txBody>
+          <a:bodyPr vert="horz" lIns="91440" tIns="45720" rIns="91440" bIns="45720" rtlCol="0" anchor="ctr"/>
+          <a:lstStyle/>
+          <a:p>
+            <a:endParaRPr lang="en-US"/>
+          </a:p>
+        </p:txBody>
+      </p:sp>
+      <p:sp>
+        <p:nvSpPr>
+          <p:cNvPr id="5" name="Notes Placeholder 4"/>
+          <p:cNvSpPr>
+            <a:spLocks noGrp="1"/>
+          </p:cNvSpPr>
+          <p:nvPr>
+            <p:ph type="body" sz="quarter" idx="3"/>
+          </p:nvPr>
+        </p:nvSpPr>
+        <p:spPr>
+          <a:xfrm>
+            <a:off x="685800" y="4400550"/>
+            <a:ext cx="5486400" cy="3600450"/>
+          </a:xfrm>
+          <a:prstGeom prst="rect">
+            <a:avLst/>
+          </a:prstGeom>
+        </p:spPr>
+        <p:txBody>
+          <a:bodyPr vert="horz" lIns="91440" tIns="45720" rIns="91440" bIns="45720" rtlCol="0"/>
+          <a:lstStyle/>
+          <a:p>
+            <a:pPr lvl="0"/>
+            <a:r>
+              <a:rPr lang="en-GB"/>
+              <a:t>Click to edit Master text styles</a:t>
+            </a:r>
+          </a:p>
+          <a:p>
+            <a:pPr lvl="1"/>
+            <a:r>
+              <a:rPr lang="en-GB"/>
+              <a:t>Second level</a:t>
+            </a:r>
+          </a:p>
+          <a:p>
+            <a:pPr lvl="2"/>
+            <a:r>
+              <a:rPr lang="en-GB"/>
+              <a:t>Third level</a:t>
+            </a:r>
+          </a:p>
+          <a:p>
+            <a:pPr lvl="3"/>
+            <a:r>
+              <a:rPr lang="en-GB"/>
+              <a:t>Fourth level</a:t>
+            </a:r>
+          </a:p>
+          <a:p>
+            <a:pPr lvl="4"/>
+            <a:r>
+              <a:rPr lang="en-GB"/>
+              <a:t>Fifth level</a:t>
+            </a:r>
+            <a:endParaRPr lang="en-US"/>
+          </a:p>
+        </p:txBody>
+      </p:sp>
+      <p:sp>
+        <p:nvSpPr>
+          <p:cNvPr id="6" name="Footer Placeholder 5"/>
+          <p:cNvSpPr>
+            <a:spLocks noGrp="1"/>
+          </p:cNvSpPr>
+          <p:nvPr>
+            <p:ph type="ftr" sz="quarter" idx="4"/>
+          </p:nvPr>
+        </p:nvSpPr>
+        <p:spPr>
+          <a:xfrm>
+            <a:off x="0" y="8685213"/>
+            <a:ext cx="2971800" cy="458787"/>
+          </a:xfrm>
+          <a:prstGeom prst="rect">
+            <a:avLst/>
+          </a:prstGeom>
+        </p:spPr>
+        <p:txBody>
+          <a:bodyPr vert="horz" lIns="91440" tIns="45720" rIns="91440" bIns="45720" rtlCol="0" anchor="b"/>
+          <a:lstStyle>
+            <a:lvl1pPr algn="l">
+              <a:defRPr sz="1200"/>
+            </a:lvl1pPr>
+          </a:lstStyle>
+          <a:p>
+            <a:endParaRPr lang="en-US"/>
+          </a:p>
+        </p:txBody>
+      </p:sp>
+      <p:sp>
+        <p:nvSpPr>
+          <p:cNvPr id="7" name="Slide Number Placeholder 6"/>
+          <p:cNvSpPr>
+            <a:spLocks noGrp="1"/>
+          </p:cNvSpPr>
+          <p:nvPr>
+            <p:ph type="sldNum" sz="quarter" idx="5"/>
+          </p:nvPr>
+        </p:nvSpPr>
+        <p:spPr>
+          <a:xfrm>
+            <a:off x="3884613" y="8685213"/>
+            <a:ext cx="2971800" cy="458787"/>
+          </a:xfrm>
+          <a:prstGeom prst="rect">
+            <a:avLst/>
+          </a:prstGeom>
+        </p:spPr>
+        <p:txBody>
+          <a:bodyPr vert="horz" lIns="91440" tIns="45720" rIns="91440" bIns="45720" rtlCol="0" anchor="b"/>
+          <a:lstStyle>
+            <a:lvl1pPr algn="r">
+              <a:defRPr sz="1200"/>
+            </a:lvl1pPr>
+          </a:lstStyle>
+          <a:p>
+            <a:fld id="{D88706E4-7558-4843-BB5D-2D69FE049A57}" type="slidenum">
+              <a:rPr lang="en-US" smtClean="0"/>
+              <a:t>‹#›</a:t>
+            </a:fld>
+            <a:endParaRPr lang="en-US"/>
+          </a:p>
+        </p:txBody>
+      </p:sp>
+    </p:spTree>
+    <p:extLst>
+      <p:ext uri="{BB962C8B-B14F-4D97-AF65-F5344CB8AC3E}">
+        <p14:creationId xmlns:p14="http://schemas.microsoft.com/office/powerpoint/2010/main" val="937686173"/>
+      </p:ext>
+    </p:extLst>
+  </p:cSld>
+  <p:clrMap bg1="lt1" tx1="dk1" bg2="lt2" tx2="dk2" accent1="accent1" accent2="accent2" accent3="accent3" accent4="accent4" accent5="accent5" accent6="accent6" hlink="hlink" folHlink="folHlink"/>
+  <p:notesStyle>
+    <a:lvl1pPr marL="0" algn="l" defTabSz="914400" rtl="0" eaLnBrk="1" latinLnBrk="0" hangingPunct="1">
+      <a:defRPr sz="1200" kern="1200">
+        <a:solidFill>
+          <a:schemeClr val="tx1"/>
+        </a:solidFill>
+        <a:latin typeface="+mn-lt"/>
+        <a:ea typeface="+mn-ea"/>
+        <a:cs typeface="+mn-cs"/>
+      </a:defRPr>
+    </a:lvl1pPr>
+    <a:lvl2pPr marL="457200" algn="l" defTabSz="914400" rtl="0" eaLnBrk="1" latinLnBrk="0" hangingPunct="1">
+      <a:defRPr sz="1200" kern="1200">
+        <a:solidFill>
+          <a:schemeClr val="tx1"/>
+        </a:solidFill>
+        <a:latin typeface="+mn-lt"/>
+        <a:ea typeface="+mn-ea"/>
+        <a:cs typeface="+mn-cs"/>
+      </a:defRPr>
+    </a:lvl2pPr>
+    <a:lvl3pPr marL="914400" algn="l" defTabSz="914400" rtl="0" eaLnBrk="1" latinLnBrk="0" hangingPunct="1">
+      <a:defRPr sz="1200" kern="1200">
+        <a:solidFill>
+          <a:schemeClr val="tx1"/>
+        </a:solidFill>
+        <a:latin typeface="+mn-lt"/>
+        <a:ea typeface="+mn-ea"/>
+        <a:cs typeface="+mn-cs"/>
+      </a:defRPr>
+    </a:lvl3pPr>
+    <a:lvl4pPr marL="1371600" algn="l" defTabSz="914400" rtl="0" eaLnBrk="1" latinLnBrk="0" hangingPunct="1">
+      <a:defRPr sz="1200" kern="1200">
+        <a:solidFill>
+          <a:schemeClr val="tx1"/>
+        </a:solidFill>
+        <a:latin typeface="+mn-lt"/>
+        <a:ea typeface="+mn-ea"/>
+        <a:cs typeface="+mn-cs"/>
+      </a:defRPr>
+    </a:lvl4pPr>
+    <a:lvl5pPr marL="1828800" algn="l" defTabSz="914400" rtl="0" eaLnBrk="1" latinLnBrk="0" hangingPunct="1">
+      <a:defRPr sz="1200" kern="1200">
+        <a:solidFill>
+          <a:schemeClr val="tx1"/>
+        </a:solidFill>
+        <a:latin typeface="+mn-lt"/>
+        <a:ea typeface="+mn-ea"/>
+        <a:cs typeface="+mn-cs"/>
+      </a:defRPr>
+    </a:lvl5pPr>
+    <a:lvl6pPr marL="2286000" algn="l" defTabSz="914400" rtl="0" eaLnBrk="1" latinLnBrk="0" hangingPunct="1">
+      <a:defRPr sz="1200" kern="1200">
+        <a:solidFill>
+          <a:schemeClr val="tx1"/>
+        </a:solidFill>
+        <a:latin typeface="+mn-lt"/>
+        <a:ea typeface="+mn-ea"/>
+        <a:cs typeface="+mn-cs"/>
+      </a:defRPr>
+    </a:lvl6pPr>
+    <a:lvl7pPr marL="2743200" algn="l" defTabSz="914400" rtl="0" eaLnBrk="1" latinLnBrk="0" hangingPunct="1">
+      <a:defRPr sz="1200" kern="1200">
+        <a:solidFill>
+          <a:schemeClr val="tx1"/>
+        </a:solidFill>
+        <a:latin typeface="+mn-lt"/>
+        <a:ea typeface="+mn-ea"/>
+        <a:cs typeface="+mn-cs"/>
+      </a:defRPr>
+    </a:lvl7pPr>
+    <a:lvl8pPr marL="3200400" algn="l" defTabSz="914400" rtl="0" eaLnBrk="1" latinLnBrk="0" hangingPunct="1">
+      <a:defRPr sz="1200" kern="1200">
+        <a:solidFill>
+          <a:schemeClr val="tx1"/>
+        </a:solidFill>
+        <a:latin typeface="+mn-lt"/>
+        <a:ea typeface="+mn-ea"/>
+        <a:cs typeface="+mn-cs"/>
+      </a:defRPr>
+    </a:lvl8pPr>
+    <a:lvl9pPr marL="3657600" algn="l" defTabSz="914400" rtl="0" eaLnBrk="1" latinLnBrk="0" hangingPunct="1">
+      <a:defRPr sz="1200" kern="1200">
+        <a:solidFill>
+          <a:schemeClr val="tx1"/>
+        </a:solidFill>
+        <a:latin typeface="+mn-lt"/>
+        <a:ea typeface="+mn-ea"/>
+        <a:cs typeface="+mn-cs"/>
+      </a:defRPr>
+    </a:lvl9pPr>
+  </p:notesStyle>
+</p:notesMaster>
+</file>
+
+<file path=ppt/notesSlides/notesSlide1.xml><?xml version="1.0" encoding="utf-8"?>
+<p:notes xmlns:a="http://schemas.openxmlformats.org/drawingml/2006/main" xmlns:r="http://schemas.openxmlformats.org/officeDocument/2006/relationships" xmlns:p="http://schemas.openxmlformats.org/presentationml/2006/main">
+  <p:cSld>
+    <p:spTree>
+      <p:nvGrpSpPr>
+        <p:cNvPr id="1" name=""/>
+        <p:cNvGrpSpPr/>
+        <p:nvPr/>
+      </p:nvGrpSpPr>
+      <p:grpSpPr>
+        <a:xfrm>
+          <a:off x="0" y="0"/>
+          <a:ext cx="0" cy="0"/>
+          <a:chOff x="0" y="0"/>
+          <a:chExt cx="0" cy="0"/>
+        </a:xfrm>
+      </p:grpSpPr>
+      <p:sp>
+        <p:nvSpPr>
+          <p:cNvPr id="2" name="Slide Image Placeholder 1"/>
+          <p:cNvSpPr>
+            <a:spLocks noGrp="1" noRot="1" noChangeAspect="1"/>
+          </p:cNvSpPr>
+          <p:nvPr>
+            <p:ph type="sldImg"/>
+          </p:nvPr>
+        </p:nvSpPr>
+        <p:spPr/>
+      </p:sp>
+      <p:sp>
+        <p:nvSpPr>
+          <p:cNvPr id="3" name="Notes Placeholder 2"/>
+          <p:cNvSpPr>
+            <a:spLocks noGrp="1"/>
+          </p:cNvSpPr>
+          <p:nvPr>
+            <p:ph type="body" idx="1"/>
+          </p:nvPr>
+        </p:nvSpPr>
+        <p:spPr/>
+        <p:txBody>
+          <a:bodyPr/>
+          <a:lstStyle/>
+          <a:p>
+            <a:endParaRPr lang="en-US"/>
+          </a:p>
+        </p:txBody>
+      </p:sp>
+      <p:sp>
+        <p:nvSpPr>
+          <p:cNvPr id="4" name="Slide Number Placeholder 3"/>
+          <p:cNvSpPr>
+            <a:spLocks noGrp="1"/>
+          </p:cNvSpPr>
+          <p:nvPr>
+            <p:ph type="sldNum" sz="quarter" idx="5"/>
+          </p:nvPr>
+        </p:nvSpPr>
+        <p:spPr/>
+        <p:txBody>
+          <a:bodyPr/>
+          <a:lstStyle/>
+          <a:p>
+            <a:fld id="{D88706E4-7558-4843-BB5D-2D69FE049A57}" type="slidenum">
+              <a:rPr lang="en-US" smtClean="0"/>
+              <a:t>12</a:t>
+            </a:fld>
+            <a:endParaRPr lang="en-US"/>
+          </a:p>
+        </p:txBody>
+      </p:sp>
+    </p:spTree>
+    <p:extLst>
+      <p:ext uri="{BB962C8B-B14F-4D97-AF65-F5344CB8AC3E}">
+        <p14:creationId xmlns:p14="http://schemas.microsoft.com/office/powerpoint/2010/main" val="460165170"/>
+      </p:ext>
+    </p:extLst>
+  </p:cSld>
+  <p:clrMapOvr>
+    <a:masterClrMapping/>
+  </p:clrMapOvr>
+</p:notes>
 </file>
 
 <file path=ppt/slideLayouts/slideLayout1.xml><?xml version="1.0" encoding="utf-8"?>
@@ -299,7 +728,7 @@
           <a:p>
             <a:fld id="{E5C141C8-61DB-4198-9B79-C4369506D355}" type="datetimeFigureOut">
               <a:rPr lang="en-GB" smtClean="0"/>
-              <a:t>05/01/2024</a:t>
+              <a:t>12/01/2024</a:t>
             </a:fld>
             <a:endParaRPr lang="en-GB"/>
           </a:p>
@@ -469,7 +898,7 @@
           <a:p>
             <a:fld id="{E5C141C8-61DB-4198-9B79-C4369506D355}" type="datetimeFigureOut">
               <a:rPr lang="en-GB" smtClean="0"/>
-              <a:t>05/01/2024</a:t>
+              <a:t>12/01/2024</a:t>
             </a:fld>
             <a:endParaRPr lang="en-GB"/>
           </a:p>
@@ -649,7 +1078,7 @@
           <a:p>
             <a:fld id="{E5C141C8-61DB-4198-9B79-C4369506D355}" type="datetimeFigureOut">
               <a:rPr lang="en-GB" smtClean="0"/>
-              <a:t>05/01/2024</a:t>
+              <a:t>12/01/2024</a:t>
             </a:fld>
             <a:endParaRPr lang="en-GB"/>
           </a:p>
@@ -819,7 +1248,7 @@
           <a:p>
             <a:fld id="{E5C141C8-61DB-4198-9B79-C4369506D355}" type="datetimeFigureOut">
               <a:rPr lang="en-GB" smtClean="0"/>
-              <a:t>05/01/2024</a:t>
+              <a:t>12/01/2024</a:t>
             </a:fld>
             <a:endParaRPr lang="en-GB"/>
           </a:p>
@@ -1065,7 +1494,7 @@
           <a:p>
             <a:fld id="{E5C141C8-61DB-4198-9B79-C4369506D355}" type="datetimeFigureOut">
               <a:rPr lang="en-GB" smtClean="0"/>
-              <a:t>05/01/2024</a:t>
+              <a:t>12/01/2024</a:t>
             </a:fld>
             <a:endParaRPr lang="en-GB"/>
           </a:p>
@@ -1297,7 +1726,7 @@
           <a:p>
             <a:fld id="{E5C141C8-61DB-4198-9B79-C4369506D355}" type="datetimeFigureOut">
               <a:rPr lang="en-GB" smtClean="0"/>
-              <a:t>05/01/2024</a:t>
+              <a:t>12/01/2024</a:t>
             </a:fld>
             <a:endParaRPr lang="en-GB"/>
           </a:p>
@@ -1664,7 +2093,7 @@
           <a:p>
             <a:fld id="{E5C141C8-61DB-4198-9B79-C4369506D355}" type="datetimeFigureOut">
               <a:rPr lang="en-GB" smtClean="0"/>
-              <a:t>05/01/2024</a:t>
+              <a:t>12/01/2024</a:t>
             </a:fld>
             <a:endParaRPr lang="en-GB"/>
           </a:p>
@@ -1782,7 +2211,7 @@
           <a:p>
             <a:fld id="{E5C141C8-61DB-4198-9B79-C4369506D355}" type="datetimeFigureOut">
               <a:rPr lang="en-GB" smtClean="0"/>
-              <a:t>05/01/2024</a:t>
+              <a:t>12/01/2024</a:t>
             </a:fld>
             <a:endParaRPr lang="en-GB"/>
           </a:p>
@@ -1877,7 +2306,7 @@
           <a:p>
             <a:fld id="{E5C141C8-61DB-4198-9B79-C4369506D355}" type="datetimeFigureOut">
               <a:rPr lang="en-GB" smtClean="0"/>
-              <a:t>05/01/2024</a:t>
+              <a:t>12/01/2024</a:t>
             </a:fld>
             <a:endParaRPr lang="en-GB"/>
           </a:p>
@@ -2154,7 +2583,7 @@
           <a:p>
             <a:fld id="{E5C141C8-61DB-4198-9B79-C4369506D355}" type="datetimeFigureOut">
               <a:rPr lang="en-GB" smtClean="0"/>
-              <a:t>05/01/2024</a:t>
+              <a:t>12/01/2024</a:t>
             </a:fld>
             <a:endParaRPr lang="en-GB"/>
           </a:p>
@@ -2407,7 +2836,7 @@
           <a:p>
             <a:fld id="{E5C141C8-61DB-4198-9B79-C4369506D355}" type="datetimeFigureOut">
               <a:rPr lang="en-GB" smtClean="0"/>
-              <a:t>05/01/2024</a:t>
+              <a:t>12/01/2024</a:t>
             </a:fld>
             <a:endParaRPr lang="en-GB"/>
           </a:p>
@@ -2626,7 +3055,7 @@
           <a:p>
             <a:fld id="{E5C141C8-61DB-4198-9B79-C4369506D355}" type="datetimeFigureOut">
               <a:rPr lang="en-GB" smtClean="0"/>
-              <a:t>05/01/2024</a:t>
+              <a:t>12/01/2024</a:t>
             </a:fld>
             <a:endParaRPr lang="en-GB"/>
           </a:p>
@@ -4523,79 +4952,6 @@
           </a:p>
         </p:txBody>
       </p:sp>
-      <p:sp>
-        <p:nvSpPr>
-          <p:cNvPr id="7" name="TextBox 6"/>
-          <p:cNvSpPr txBox="1"/>
-          <p:nvPr/>
-        </p:nvSpPr>
-        <p:spPr>
-          <a:xfrm>
-            <a:off x="909637" y="5705753"/>
-            <a:ext cx="10372725" cy="1200329"/>
-          </a:xfrm>
-          <a:prstGeom prst="rect">
-            <a:avLst/>
-          </a:prstGeom>
-          <a:noFill/>
-        </p:spPr>
-        <p:txBody>
-          <a:bodyPr wrap="square" rtlCol="0">
-            <a:spAutoFit/>
-          </a:bodyPr>
-          <a:lstStyle/>
-          <a:p>
-            <a:r>
-              <a:rPr lang="en-GB" sz="2400" dirty="0">
-                <a:solidFill>
-                  <a:srgbClr val="FF0000"/>
-                </a:solidFill>
-              </a:rPr>
-              <a:t>Notice here that </a:t>
-            </a:r>
-            <a:r>
-              <a:rPr lang="en-GB" sz="4000" dirty="0">
-                <a:solidFill>
-                  <a:srgbClr val="FF0000"/>
-                </a:solidFill>
-              </a:rPr>
-              <a:t>theory</a:t>
-            </a:r>
-            <a:r>
-              <a:rPr lang="en-GB" sz="2400" dirty="0">
-                <a:solidFill>
-                  <a:srgbClr val="FF0000"/>
-                </a:solidFill>
-              </a:rPr>
-              <a:t> is </a:t>
-            </a:r>
-            <a:r>
-              <a:rPr lang="en-GB" sz="4000" dirty="0">
-                <a:solidFill>
-                  <a:srgbClr val="FF0000"/>
-                </a:solidFill>
-              </a:rPr>
-              <a:t>not</a:t>
-            </a:r>
-            <a:r>
-              <a:rPr lang="en-GB" sz="2400" dirty="0">
-                <a:solidFill>
-                  <a:srgbClr val="FF0000"/>
-                </a:solidFill>
-              </a:rPr>
-              <a:t> necessarily part of the scientific process. You can run the scientific method to establish an </a:t>
-            </a:r>
-            <a:r>
-              <a:rPr lang="en-GB" sz="3200" dirty="0">
-                <a:solidFill>
-                  <a:srgbClr val="FF0000"/>
-                </a:solidFill>
-              </a:rPr>
-              <a:t>observation</a:t>
-            </a:r>
-          </a:p>
-        </p:txBody>
-      </p:sp>
     </p:spTree>
     <p:extLst>
       <p:ext uri="{BB962C8B-B14F-4D97-AF65-F5344CB8AC3E}">
@@ -4749,51 +5105,6 @@
                       </p:childTnLst>
                     </p:cTn>
                   </p:par>
-                  <p:par>
-                    <p:cTn id="15" fill="hold">
-                      <p:stCondLst>
-                        <p:cond delay="indefinite"/>
-                      </p:stCondLst>
-                      <p:childTnLst>
-                        <p:par>
-                          <p:cTn id="16" fill="hold">
-                            <p:stCondLst>
-                              <p:cond delay="0"/>
-                            </p:stCondLst>
-                            <p:childTnLst>
-                              <p:par>
-                                <p:cTn id="17" presetID="1" presetClass="entr" presetSubtype="0" fill="hold" grpId="0" nodeType="clickEffect">
-                                  <p:stCondLst>
-                                    <p:cond delay="0"/>
-                                  </p:stCondLst>
-                                  <p:childTnLst>
-                                    <p:set>
-                                      <p:cBhvr>
-                                        <p:cTn id="18" dur="1" fill="hold">
-                                          <p:stCondLst>
-                                            <p:cond delay="0"/>
-                                          </p:stCondLst>
-                                        </p:cTn>
-                                        <p:tgtEl>
-                                          <p:spTgt spid="7"/>
-                                        </p:tgtEl>
-                                        <p:attrNameLst>
-                                          <p:attrName>style.visibility</p:attrName>
-                                        </p:attrNameLst>
-                                      </p:cBhvr>
-                                      <p:to>
-                                        <p:strVal val="visible"/>
-                                      </p:to>
-                                    </p:set>
-                                  </p:childTnLst>
-                                </p:cTn>
-                              </p:par>
-                            </p:childTnLst>
-                          </p:cTn>
-                        </p:par>
-                      </p:childTnLst>
-                    </p:cTn>
-                  </p:par>
                 </p:childTnLst>
               </p:cTn>
               <p:prevCondLst>
@@ -4819,7 +5130,6 @@
       <p:bldP spid="4" grpId="0"/>
       <p:bldP spid="5" grpId="0"/>
       <p:bldP spid="6" grpId="0"/>
-      <p:bldP spid="7" grpId="0"/>
     </p:bldLst>
   </p:timing>
 </p:sld>
@@ -5424,7 +5734,7 @@
             </a:pPr>
             <a:r>
               <a:rPr lang="en-GB" dirty="0"/>
-              <a:t>This provides a </a:t>
+              <a:t>This potentially provides a </a:t>
             </a:r>
             <a:r>
               <a:rPr lang="en-GB" u="sng" dirty="0"/>
@@ -5432,16 +5742,7 @@
             </a:r>
             <a:r>
               <a:rPr lang="en-GB" dirty="0"/>
-              <a:t> aspect to the scientific method.</a:t>
-            </a:r>
-          </a:p>
-          <a:p>
-            <a:pPr marL="0" indent="0">
-              <a:buNone/>
-            </a:pPr>
-            <a:r>
-              <a:rPr lang="en-GB" dirty="0"/>
-              <a:t>	Errors / misconduct are discovered by later scientists. </a:t>
+              <a:t> aspect to the scientific method. Errors / misconduct are discovered by later scientists. </a:t>
             </a:r>
           </a:p>
         </p:txBody>
@@ -5493,7 +5794,7 @@
           <a:p>
             <a:r>
               <a:rPr lang="en-GB" dirty="0"/>
-              <a:t>What the scientific method can (vs can’t) do</a:t>
+              <a:t>What the scientific method can (vs. can’t) do</a:t>
             </a:r>
           </a:p>
         </p:txBody>
@@ -5725,16 +6026,16 @@
             </a:pPr>
             <a:r>
               <a:rPr lang="en-GB" dirty="0"/>
-              <a:t>12 x 2 hour lectures 			</a:t>
-            </a:r>
-          </a:p>
-          <a:p>
-            <a:pPr marL="0" indent="0">
-              <a:buNone/>
-            </a:pPr>
-            <a:r>
-              <a:rPr lang="en-GB" dirty="0"/>
-              <a:t>12 x 1 hour workshops 	</a:t>
+              <a:t>11 x 2-hour lectures			</a:t>
+            </a:r>
+          </a:p>
+          <a:p>
+            <a:pPr marL="0" indent="0">
+              <a:buNone/>
+            </a:pPr>
+            <a:r>
+              <a:rPr lang="en-GB" dirty="0"/>
+              <a:t>10 x 1 hour workshops 	</a:t>
             </a:r>
           </a:p>
           <a:p>
@@ -5753,33 +6054,6 @@
             <a:r>
               <a:rPr lang="en-GB" dirty="0"/>
               <a:t>	</a:t>
-            </a:r>
-          </a:p>
-          <a:p>
-            <a:pPr marL="0" indent="0">
-              <a:buNone/>
-            </a:pPr>
-            <a:r>
-              <a:rPr lang="en-GB" dirty="0"/>
-              <a:t>Office hour support from staff teaching on module</a:t>
-            </a:r>
-          </a:p>
-          <a:p>
-            <a:pPr marL="0" indent="0">
-              <a:buNone/>
-            </a:pPr>
-            <a:r>
-              <a:rPr lang="en-GB" dirty="0"/>
-              <a:t>	Prof. Tim Hollins</a:t>
-            </a:r>
-          </a:p>
-          <a:p>
-            <a:pPr marL="0" indent="0">
-              <a:buNone/>
-            </a:pPr>
-            <a:r>
-              <a:rPr lang="en-GB" dirty="0"/>
-              <a:t>	Prof. Mark Tarrant</a:t>
             </a:r>
           </a:p>
           <a:p>
@@ -6237,25 +6511,7 @@
             </a:pPr>
             <a:r>
               <a:rPr lang="en-GB" dirty="0"/>
-              <a:t>	e.g. 	Ghosts are real. </a:t>
-            </a:r>
-          </a:p>
-          <a:p>
-            <a:pPr marL="0" indent="0">
-              <a:buNone/>
-            </a:pPr>
-            <a:r>
-              <a:rPr lang="en-GB" dirty="0"/>
-              <a:t>		Mind-reading works if you believe in it enough.</a:t>
-            </a:r>
-          </a:p>
-          <a:p>
-            <a:pPr marL="0" indent="0">
-              <a:buNone/>
-            </a:pPr>
-            <a:r>
-              <a:rPr lang="en-GB" dirty="0"/>
-              <a:t>		I will go to heaven if I’ve been good enough.  </a:t>
+              <a:t>	</a:t>
             </a:r>
           </a:p>
         </p:txBody>
@@ -6371,15 +6627,6 @@
             <a:pPr marL="0" indent="0">
               <a:buNone/>
             </a:pPr>
-            <a:r>
-              <a:rPr lang="en-GB" dirty="0"/>
-              <a:t>	i.e. “truth” is subjective.</a:t>
-            </a:r>
-          </a:p>
-          <a:p>
-            <a:pPr marL="0" indent="0">
-              <a:buNone/>
-            </a:pPr>
             <a:endParaRPr lang="en-GB" dirty="0"/>
           </a:p>
           <a:p>
@@ -6446,7 +6693,7 @@
           <a:p>
             <a:r>
               <a:rPr lang="en-GB" dirty="0"/>
-              <a:t>Rather than seeking “truth”, think of science as delivering answers that are less wrong. </a:t>
+              <a:t>Think of science as delivering answers that are less wrong. </a:t>
             </a:r>
           </a:p>
         </p:txBody>
@@ -6646,7 +6893,15 @@
             </a:pPr>
             <a:r>
               <a:rPr lang="en-GB" dirty="0"/>
-              <a:t>It doesn’t mean Theory A is TRUE, just less wrong than Theory B (in this instance). </a:t>
+              <a:t>Theory A </a:t>
+            </a:r>
+            <a:r>
+              <a:rPr lang="en-GB"/>
+              <a:t>is less </a:t>
+            </a:r>
+            <a:r>
+              <a:rPr lang="en-GB" dirty="0"/>
+              <a:t>wrong than Theory B (in this instance). </a:t>
             </a:r>
           </a:p>
         </p:txBody>
@@ -11596,7 +11851,7 @@
             </a:pPr>
             <a:r>
               <a:rPr lang="en-GB" dirty="0"/>
-              <a:t>We rely on accepting “facts” from others – particularly those we trust (including experts).  Society wouldn’t function otherwise. </a:t>
+              <a:t>We rely on accepting “facts” from others – particularly those we trust (including experts).  </a:t>
             </a:r>
           </a:p>
           <a:p>
@@ -12313,7 +12568,317 @@
 </a:theme>
 </file>
 
+<file path=ppt/theme/theme2.xml><?xml version="1.0" encoding="utf-8"?>
+<a:theme xmlns:a="http://schemas.openxmlformats.org/drawingml/2006/main" name="Office Theme">
+  <a:themeElements>
+    <a:clrScheme name="Office">
+      <a:dk1>
+        <a:sysClr val="windowText" lastClr="000000"/>
+      </a:dk1>
+      <a:lt1>
+        <a:sysClr val="window" lastClr="FFFFFF"/>
+      </a:lt1>
+      <a:dk2>
+        <a:srgbClr val="44546A"/>
+      </a:dk2>
+      <a:lt2>
+        <a:srgbClr val="E7E6E6"/>
+      </a:lt2>
+      <a:accent1>
+        <a:srgbClr val="4472C4"/>
+      </a:accent1>
+      <a:accent2>
+        <a:srgbClr val="ED7D31"/>
+      </a:accent2>
+      <a:accent3>
+        <a:srgbClr val="A5A5A5"/>
+      </a:accent3>
+      <a:accent4>
+        <a:srgbClr val="FFC000"/>
+      </a:accent4>
+      <a:accent5>
+        <a:srgbClr val="5B9BD5"/>
+      </a:accent5>
+      <a:accent6>
+        <a:srgbClr val="70AD47"/>
+      </a:accent6>
+      <a:hlink>
+        <a:srgbClr val="0563C1"/>
+      </a:hlink>
+      <a:folHlink>
+        <a:srgbClr val="954F72"/>
+      </a:folHlink>
+    </a:clrScheme>
+    <a:fontScheme name="Office">
+      <a:majorFont>
+        <a:latin typeface="Calibri Light" panose="020F0302020204030204"/>
+        <a:ea typeface=""/>
+        <a:cs typeface=""/>
+        <a:font script="Jpan" typeface="游ゴシック Light"/>
+        <a:font script="Hang" typeface="맑은 고딕"/>
+        <a:font script="Hans" typeface="等线 Light"/>
+        <a:font script="Hant" typeface="新細明體"/>
+        <a:font script="Arab" typeface="Times New Roman"/>
+        <a:font script="Hebr" typeface="Times New Roman"/>
+        <a:font script="Thai" typeface="Angsana New"/>
+        <a:font script="Ethi" typeface="Nyala"/>
+        <a:font script="Beng" typeface="Vrinda"/>
+        <a:font script="Gujr" typeface="Shruti"/>
+        <a:font script="Khmr" typeface="MoolBoran"/>
+        <a:font script="Knda" typeface="Tunga"/>
+        <a:font script="Guru" typeface="Raavi"/>
+        <a:font script="Cans" typeface="Euphemia"/>
+        <a:font script="Cher" typeface="Plantagenet Cherokee"/>
+        <a:font script="Yiii" typeface="Microsoft Yi Baiti"/>
+        <a:font script="Tibt" typeface="Microsoft Himalaya"/>
+        <a:font script="Thaa" typeface="MV Boli"/>
+        <a:font script="Deva" typeface="Mangal"/>
+        <a:font script="Telu" typeface="Gautami"/>
+        <a:font script="Taml" typeface="Latha"/>
+        <a:font script="Syrc" typeface="Estrangelo Edessa"/>
+        <a:font script="Orya" typeface="Kalinga"/>
+        <a:font script="Mlym" typeface="Kartika"/>
+        <a:font script="Laoo" typeface="DokChampa"/>
+        <a:font script="Sinh" typeface="Iskoola Pota"/>
+        <a:font script="Mong" typeface="Mongolian Baiti"/>
+        <a:font script="Viet" typeface="Times New Roman"/>
+        <a:font script="Uigh" typeface="Microsoft Uighur"/>
+        <a:font script="Geor" typeface="Sylfaen"/>
+        <a:font script="Armn" typeface="Arial"/>
+        <a:font script="Bugi" typeface="Leelawadee UI"/>
+        <a:font script="Bopo" typeface="Microsoft JhengHei"/>
+        <a:font script="Java" typeface="Javanese Text"/>
+        <a:font script="Lisu" typeface="Segoe UI"/>
+        <a:font script="Mymr" typeface="Myanmar Text"/>
+        <a:font script="Nkoo" typeface="Ebrima"/>
+        <a:font script="Olck" typeface="Nirmala UI"/>
+        <a:font script="Osma" typeface="Ebrima"/>
+        <a:font script="Phag" typeface="Phagspa"/>
+        <a:font script="Syrn" typeface="Estrangelo Edessa"/>
+        <a:font script="Syrj" typeface="Estrangelo Edessa"/>
+        <a:font script="Syre" typeface="Estrangelo Edessa"/>
+        <a:font script="Sora" typeface="Nirmala UI"/>
+        <a:font script="Tale" typeface="Microsoft Tai Le"/>
+        <a:font script="Talu" typeface="Microsoft New Tai Lue"/>
+        <a:font script="Tfng" typeface="Ebrima"/>
+      </a:majorFont>
+      <a:minorFont>
+        <a:latin typeface="Calibri" panose="020F0502020204030204"/>
+        <a:ea typeface=""/>
+        <a:cs typeface=""/>
+        <a:font script="Jpan" typeface="游ゴシック"/>
+        <a:font script="Hang" typeface="맑은 고딕"/>
+        <a:font script="Hans" typeface="等线"/>
+        <a:font script="Hant" typeface="新細明體"/>
+        <a:font script="Arab" typeface="Arial"/>
+        <a:font script="Hebr" typeface="Arial"/>
+        <a:font script="Thai" typeface="Cordia New"/>
+        <a:font script="Ethi" typeface="Nyala"/>
+        <a:font script="Beng" typeface="Vrinda"/>
+        <a:font script="Gujr" typeface="Shruti"/>
+        <a:font script="Khmr" typeface="DaunPenh"/>
+        <a:font script="Knda" typeface="Tunga"/>
+        <a:font script="Guru" typeface="Raavi"/>
+        <a:font script="Cans" typeface="Euphemia"/>
+        <a:font script="Cher" typeface="Plantagenet Cherokee"/>
+        <a:font script="Yiii" typeface="Microsoft Yi Baiti"/>
+        <a:font script="Tibt" typeface="Microsoft Himalaya"/>
+        <a:font script="Thaa" typeface="MV Boli"/>
+        <a:font script="Deva" typeface="Mangal"/>
+        <a:font script="Telu" typeface="Gautami"/>
+        <a:font script="Taml" typeface="Latha"/>
+        <a:font script="Syrc" typeface="Estrangelo Edessa"/>
+        <a:font script="Orya" typeface="Kalinga"/>
+        <a:font script="Mlym" typeface="Kartika"/>
+        <a:font script="Laoo" typeface="DokChampa"/>
+        <a:font script="Sinh" typeface="Iskoola Pota"/>
+        <a:font script="Mong" typeface="Mongolian Baiti"/>
+        <a:font script="Viet" typeface="Arial"/>
+        <a:font script="Uigh" typeface="Microsoft Uighur"/>
+        <a:font script="Geor" typeface="Sylfaen"/>
+        <a:font script="Armn" typeface="Arial"/>
+        <a:font script="Bugi" typeface="Leelawadee UI"/>
+        <a:font script="Bopo" typeface="Microsoft JhengHei"/>
+        <a:font script="Java" typeface="Javanese Text"/>
+        <a:font script="Lisu" typeface="Segoe UI"/>
+        <a:font script="Mymr" typeface="Myanmar Text"/>
+        <a:font script="Nkoo" typeface="Ebrima"/>
+        <a:font script="Olck" typeface="Nirmala UI"/>
+        <a:font script="Osma" typeface="Ebrima"/>
+        <a:font script="Phag" typeface="Phagspa"/>
+        <a:font script="Syrn" typeface="Estrangelo Edessa"/>
+        <a:font script="Syrj" typeface="Estrangelo Edessa"/>
+        <a:font script="Syre" typeface="Estrangelo Edessa"/>
+        <a:font script="Sora" typeface="Nirmala UI"/>
+        <a:font script="Tale" typeface="Microsoft Tai Le"/>
+        <a:font script="Talu" typeface="Microsoft New Tai Lue"/>
+        <a:font script="Tfng" typeface="Ebrima"/>
+      </a:minorFont>
+    </a:fontScheme>
+    <a:fmtScheme name="Office">
+      <a:fillStyleLst>
+        <a:solidFill>
+          <a:schemeClr val="phClr"/>
+        </a:solidFill>
+        <a:gradFill rotWithShape="1">
+          <a:gsLst>
+            <a:gs pos="0">
+              <a:schemeClr val="phClr">
+                <a:lumMod val="110000"/>
+                <a:satMod val="105000"/>
+                <a:tint val="67000"/>
+              </a:schemeClr>
+            </a:gs>
+            <a:gs pos="50000">
+              <a:schemeClr val="phClr">
+                <a:lumMod val="105000"/>
+                <a:satMod val="103000"/>
+                <a:tint val="73000"/>
+              </a:schemeClr>
+            </a:gs>
+            <a:gs pos="100000">
+              <a:schemeClr val="phClr">
+                <a:lumMod val="105000"/>
+                <a:satMod val="109000"/>
+                <a:tint val="81000"/>
+              </a:schemeClr>
+            </a:gs>
+          </a:gsLst>
+          <a:lin ang="5400000" scaled="0"/>
+        </a:gradFill>
+        <a:gradFill rotWithShape="1">
+          <a:gsLst>
+            <a:gs pos="0">
+              <a:schemeClr val="phClr">
+                <a:satMod val="103000"/>
+                <a:lumMod val="102000"/>
+                <a:tint val="94000"/>
+              </a:schemeClr>
+            </a:gs>
+            <a:gs pos="50000">
+              <a:schemeClr val="phClr">
+                <a:satMod val="110000"/>
+                <a:lumMod val="100000"/>
+                <a:shade val="100000"/>
+              </a:schemeClr>
+            </a:gs>
+            <a:gs pos="100000">
+              <a:schemeClr val="phClr">
+                <a:lumMod val="99000"/>
+                <a:satMod val="120000"/>
+                <a:shade val="78000"/>
+              </a:schemeClr>
+            </a:gs>
+          </a:gsLst>
+          <a:lin ang="5400000" scaled="0"/>
+        </a:gradFill>
+      </a:fillStyleLst>
+      <a:lnStyleLst>
+        <a:ln w="6350" cap="flat" cmpd="sng" algn="ctr">
+          <a:solidFill>
+            <a:schemeClr val="phClr"/>
+          </a:solidFill>
+          <a:prstDash val="solid"/>
+          <a:miter lim="800000"/>
+        </a:ln>
+        <a:ln w="12700" cap="flat" cmpd="sng" algn="ctr">
+          <a:solidFill>
+            <a:schemeClr val="phClr"/>
+          </a:solidFill>
+          <a:prstDash val="solid"/>
+          <a:miter lim="800000"/>
+        </a:ln>
+        <a:ln w="19050" cap="flat" cmpd="sng" algn="ctr">
+          <a:solidFill>
+            <a:schemeClr val="phClr"/>
+          </a:solidFill>
+          <a:prstDash val="solid"/>
+          <a:miter lim="800000"/>
+        </a:ln>
+      </a:lnStyleLst>
+      <a:effectStyleLst>
+        <a:effectStyle>
+          <a:effectLst/>
+        </a:effectStyle>
+        <a:effectStyle>
+          <a:effectLst/>
+        </a:effectStyle>
+        <a:effectStyle>
+          <a:effectLst>
+            <a:outerShdw blurRad="57150" dist="19050" dir="5400000" algn="ctr" rotWithShape="0">
+              <a:srgbClr val="000000">
+                <a:alpha val="63000"/>
+              </a:srgbClr>
+            </a:outerShdw>
+          </a:effectLst>
+        </a:effectStyle>
+      </a:effectStyleLst>
+      <a:bgFillStyleLst>
+        <a:solidFill>
+          <a:schemeClr val="phClr"/>
+        </a:solidFill>
+        <a:solidFill>
+          <a:schemeClr val="phClr">
+            <a:tint val="95000"/>
+            <a:satMod val="170000"/>
+          </a:schemeClr>
+        </a:solidFill>
+        <a:gradFill rotWithShape="1">
+          <a:gsLst>
+            <a:gs pos="0">
+              <a:schemeClr val="phClr">
+                <a:tint val="93000"/>
+                <a:satMod val="150000"/>
+                <a:shade val="98000"/>
+                <a:lumMod val="102000"/>
+              </a:schemeClr>
+            </a:gs>
+            <a:gs pos="50000">
+              <a:schemeClr val="phClr">
+                <a:tint val="98000"/>
+                <a:satMod val="130000"/>
+                <a:shade val="90000"/>
+                <a:lumMod val="103000"/>
+              </a:schemeClr>
+            </a:gs>
+            <a:gs pos="100000">
+              <a:schemeClr val="phClr">
+                <a:shade val="63000"/>
+                <a:satMod val="120000"/>
+              </a:schemeClr>
+            </a:gs>
+          </a:gsLst>
+          <a:lin ang="5400000" scaled="0"/>
+        </a:gradFill>
+      </a:bgFillStyleLst>
+    </a:fmtScheme>
+  </a:themeElements>
+  <a:objectDefaults/>
+  <a:extraClrSchemeLst/>
+  <a:extLst>
+    <a:ext uri="{05A4C25C-085E-4340-85A3-A5531E510DB2}">
+      <thm15:themeFamily xmlns:thm15="http://schemas.microsoft.com/office/thememl/2012/main" name="Office Theme" id="{62F939B6-93AF-4DB8-9C6B-D6C7DFDC589F}" vid="{4A3C46E8-61CC-4603-A589-7422A47A8E4A}"/>
+    </a:ext>
+  </a:extLst>
+</a:theme>
+</file>
+
 <file path=customXml/item1.xml><?xml version="1.0" encoding="utf-8"?>
+<p:properties xmlns:p="http://schemas.microsoft.com/office/2006/metadata/properties" xmlns:xsi="http://www.w3.org/2001/XMLSchema-instance" xmlns:pc="http://schemas.microsoft.com/office/infopath/2007/PartnerControls">
+  <documentManagement/>
+</p:properties>
+</file>
+
+<file path=customXml/item2.xml><?xml version="1.0" encoding="utf-8"?>
+<?mso-contentType ?>
+<FormTemplates xmlns="http://schemas.microsoft.com/sharepoint/v3/contenttype/forms">
+  <Display>DocumentLibraryForm</Display>
+  <Edit>DocumentLibraryForm</Edit>
+  <New>DocumentLibraryForm</New>
+</FormTemplates>
+</file>
+
+<file path=customXml/item3.xml><?xml version="1.0" encoding="utf-8"?>
 <ct:contentTypeSchema xmlns:ct="http://schemas.microsoft.com/office/2006/metadata/contentType" xmlns:ma="http://schemas.microsoft.com/office/2006/metadata/properties/metaAttributes" ct:_="" ma:_="" ma:contentTypeName="Document" ma:contentTypeID="0x010100CDC7DA200EEB3445AF1982F3D7270397" ma:contentTypeVersion="14" ma:contentTypeDescription="Create a new document." ma:contentTypeScope="" ma:versionID="8ec0b2246017092d04bce6716d92dcc9">
   <xsd:schema xmlns:xsd="http://www.w3.org/2001/XMLSchema" xmlns:xs="http://www.w3.org/2001/XMLSchema" xmlns:p="http://schemas.microsoft.com/office/2006/metadata/properties" xmlns:ns3="21c8a05f-379f-4a3f-aa4a-81ea9db359bc" xmlns:ns4="0322879f-8624-447d-a89c-1c2bd66f8e04" targetNamespace="http://schemas.microsoft.com/office/2006/metadata/properties" ma:root="true" ma:fieldsID="aa4f8e6e825201c9e1a4f40d409a5ff0" ns3:_="" ns4:_="">
     <xsd:import namespace="21c8a05f-379f-4a3f-aa4a-81ea9db359bc"/>
@@ -12542,22 +13107,32 @@
 </ct:contentTypeSchema>
 </file>
 
-<file path=customXml/item2.xml><?xml version="1.0" encoding="utf-8"?>
-<p:properties xmlns:p="http://schemas.microsoft.com/office/2006/metadata/properties" xmlns:xsi="http://www.w3.org/2001/XMLSchema-instance" xmlns:pc="http://schemas.microsoft.com/office/infopath/2007/PartnerControls">
-  <documentManagement/>
-</p:properties>
+<file path=customXml/itemProps1.xml><?xml version="1.0" encoding="utf-8"?>
+<ds:datastoreItem xmlns:ds="http://schemas.openxmlformats.org/officeDocument/2006/customXml" ds:itemID="{B6617797-34A9-4FB1-9A07-D396B12A8668}">
+  <ds:schemaRefs>
+    <ds:schemaRef ds:uri="http://purl.org/dc/terms/"/>
+    <ds:schemaRef ds:uri="http://schemas.openxmlformats.org/package/2006/metadata/core-properties"/>
+    <ds:schemaRef ds:uri="http://schemas.microsoft.com/office/2006/documentManagement/types"/>
+    <ds:schemaRef ds:uri="0322879f-8624-447d-a89c-1c2bd66f8e04"/>
+    <ds:schemaRef ds:uri="http://purl.org/dc/elements/1.1/"/>
+    <ds:schemaRef ds:uri="http://schemas.microsoft.com/office/2006/metadata/properties"/>
+    <ds:schemaRef ds:uri="http://schemas.microsoft.com/office/infopath/2007/PartnerControls"/>
+    <ds:schemaRef ds:uri="21c8a05f-379f-4a3f-aa4a-81ea9db359bc"/>
+    <ds:schemaRef ds:uri="http://www.w3.org/XML/1998/namespace"/>
+    <ds:schemaRef ds:uri="http://purl.org/dc/dcmitype/"/>
+  </ds:schemaRefs>
+</ds:datastoreItem>
 </file>
 
-<file path=customXml/item3.xml><?xml version="1.0" encoding="utf-8"?>
-<?mso-contentType ?>
-<FormTemplates xmlns="http://schemas.microsoft.com/sharepoint/v3/contenttype/forms">
-  <Display>DocumentLibraryForm</Display>
-  <Edit>DocumentLibraryForm</Edit>
-  <New>DocumentLibraryForm</New>
-</FormTemplates>
+<file path=customXml/itemProps2.xml><?xml version="1.0" encoding="utf-8"?>
+<ds:datastoreItem xmlns:ds="http://schemas.openxmlformats.org/officeDocument/2006/customXml" ds:itemID="{F4A5D631-0828-45C2-B737-825043D01CBF}">
+  <ds:schemaRefs>
+    <ds:schemaRef ds:uri="http://schemas.microsoft.com/sharepoint/v3/contenttype/forms"/>
+  </ds:schemaRefs>
+</ds:datastoreItem>
 </file>
 
-<file path=customXml/itemProps1.xml><?xml version="1.0" encoding="utf-8"?>
+<file path=customXml/itemProps3.xml><?xml version="1.0" encoding="utf-8"?>
 <ds:datastoreItem xmlns:ds="http://schemas.openxmlformats.org/officeDocument/2006/customXml" ds:itemID="{007F6972-5F1F-4BEB-9345-B279380A9AAC}">
   <ds:schemaRefs>
     <ds:schemaRef ds:uri="http://schemas.microsoft.com/office/2006/metadata/contentType"/>
@@ -12574,29 +13149,4 @@
     <ds:schemaRef ds:uri="http://schemas.microsoft.com/internal/obd"/>
   </ds:schemaRefs>
 </ds:datastoreItem>
-</file>
-
-<file path=customXml/itemProps2.xml><?xml version="1.0" encoding="utf-8"?>
-<ds:datastoreItem xmlns:ds="http://schemas.openxmlformats.org/officeDocument/2006/customXml" ds:itemID="{B6617797-34A9-4FB1-9A07-D396B12A8668}">
-  <ds:schemaRefs>
-    <ds:schemaRef ds:uri="http://purl.org/dc/terms/"/>
-    <ds:schemaRef ds:uri="http://schemas.openxmlformats.org/package/2006/metadata/core-properties"/>
-    <ds:schemaRef ds:uri="http://schemas.microsoft.com/office/2006/documentManagement/types"/>
-    <ds:schemaRef ds:uri="0322879f-8624-447d-a89c-1c2bd66f8e04"/>
-    <ds:schemaRef ds:uri="http://purl.org/dc/elements/1.1/"/>
-    <ds:schemaRef ds:uri="http://schemas.microsoft.com/office/2006/metadata/properties"/>
-    <ds:schemaRef ds:uri="http://schemas.microsoft.com/office/infopath/2007/PartnerControls"/>
-    <ds:schemaRef ds:uri="21c8a05f-379f-4a3f-aa4a-81ea9db359bc"/>
-    <ds:schemaRef ds:uri="http://www.w3.org/XML/1998/namespace"/>
-    <ds:schemaRef ds:uri="http://purl.org/dc/dcmitype/"/>
-  </ds:schemaRefs>
-</ds:datastoreItem>
-</file>
-
-<file path=customXml/itemProps3.xml><?xml version="1.0" encoding="utf-8"?>
-<ds:datastoreItem xmlns:ds="http://schemas.openxmlformats.org/officeDocument/2006/customXml" ds:itemID="{F4A5D631-0828-45C2-B737-825043D01CBF}">
-  <ds:schemaRefs>
-    <ds:schemaRef ds:uri="http://schemas.microsoft.com/sharepoint/v3/contenttype/forms"/>
-  </ds:schemaRefs>
-</ds:datastoreItem>
 </file>
</xml_diff>